<commit_message>
correcting a small typo
</commit_message>
<xml_diff>
--- a/Chanco_STA6206_BDA_2019_Henrion_Practical3.pptx
+++ b/Chanco_STA6206_BDA_2019_Henrion_Practical3.pptx
@@ -4560,7 +4560,7 @@
                       <m:t>:</m:t>
                     </m:r>
                     <m:r>
-                      <m:t>θ</m:t>
+                      <m:t>π</m:t>
                     </m:r>
                     <m:r>
                       <m:t>∈</m:t>
@@ -4599,7 +4599,7 @@
                       <m:t>:</m:t>
                     </m:r>
                     <m:r>
-                      <m:t>θ</m:t>
+                      <m:t>π</m:t>
                     </m:r>
                     <m:r>
                       <m:t>∈</m:t>

</xml_diff>